<commit_message>
Updated introduction and research question
</commit_message>
<xml_diff>
--- a/presentation/Social Contagion of Obesity Presentation.pptx
+++ b/presentation/Social Contagion of Obesity Presentation.pptx
@@ -374,7 +374,7 @@
     </p:spTree>
     <p:extLst>
       <p:ext uri="{BB962C8B-B14F-4D97-AF65-F5344CB8AC3E}">
-        <p14:creationId xmlns:p14="http://schemas.microsoft.com/office/powerpoint/2010/main" xmlns="" val="277359971"/>
+        <p14:creationId xmlns="" xmlns:p14="http://schemas.microsoft.com/office/powerpoint/2010/main" val="277359971"/>
       </p:ext>
     </p:extLst>
   </p:cSld>
@@ -705,7 +705,7 @@
           <a:blip r:embed="rId2">
             <a:extLst>
               <a:ext uri="{28A0092B-C50C-407E-A947-70E740481C1C}">
-                <a14:useLocalDpi xmlns:a14="http://schemas.microsoft.com/office/drawing/2010/main" xmlns="" val="0"/>
+                <a14:useLocalDpi xmlns="" xmlns:a14="http://schemas.microsoft.com/office/drawing/2010/main" val="0"/>
               </a:ext>
             </a:extLst>
           </a:blip>
@@ -770,7 +770,7 @@
     </p:spTree>
     <p:extLst>
       <p:ext uri="{BB962C8B-B14F-4D97-AF65-F5344CB8AC3E}">
-        <p14:creationId xmlns:p14="http://schemas.microsoft.com/office/powerpoint/2010/main" xmlns="" val="826009964"/>
+        <p14:creationId xmlns="" xmlns:p14="http://schemas.microsoft.com/office/powerpoint/2010/main" val="826009964"/>
       </p:ext>
     </p:extLst>
   </p:cSld>
@@ -931,7 +931,7 @@
     </p:spTree>
     <p:extLst>
       <p:ext uri="{BB962C8B-B14F-4D97-AF65-F5344CB8AC3E}">
-        <p14:creationId xmlns:p14="http://schemas.microsoft.com/office/powerpoint/2010/main" xmlns="" val="748044121"/>
+        <p14:creationId xmlns="" xmlns:p14="http://schemas.microsoft.com/office/powerpoint/2010/main" val="748044121"/>
       </p:ext>
     </p:extLst>
   </p:cSld>
@@ -1247,7 +1247,7 @@
     </p:spTree>
     <p:extLst>
       <p:ext uri="{BB962C8B-B14F-4D97-AF65-F5344CB8AC3E}">
-        <p14:creationId xmlns:p14="http://schemas.microsoft.com/office/powerpoint/2010/main" xmlns="" val="826009964"/>
+        <p14:creationId xmlns="" xmlns:p14="http://schemas.microsoft.com/office/powerpoint/2010/main" val="826009964"/>
       </p:ext>
     </p:extLst>
   </p:cSld>
@@ -1566,7 +1566,7 @@
     </p:spTree>
     <p:extLst>
       <p:ext uri="{BB962C8B-B14F-4D97-AF65-F5344CB8AC3E}">
-        <p14:creationId xmlns:p14="http://schemas.microsoft.com/office/powerpoint/2010/main" xmlns="" val="1490291718"/>
+        <p14:creationId xmlns="" xmlns:p14="http://schemas.microsoft.com/office/powerpoint/2010/main" val="1490291718"/>
       </p:ext>
     </p:extLst>
   </p:cSld>
@@ -1907,7 +1907,7 @@
             <a:blip r:embed="rId3">
               <a:extLst>
                 <a:ext uri="{28A0092B-C50C-407E-A947-70E740481C1C}">
-                  <a14:useLocalDpi xmlns:a14="http://schemas.microsoft.com/office/drawing/2010/main" xmlns="" val="0"/>
+                  <a14:useLocalDpi xmlns="" xmlns:a14="http://schemas.microsoft.com/office/drawing/2010/main" val="0"/>
                 </a:ext>
               </a:extLst>
             </a:blip>
@@ -1970,7 +1970,7 @@
     </p:spTree>
     <p:extLst>
       <p:ext uri="{BB962C8B-B14F-4D97-AF65-F5344CB8AC3E}">
-        <p14:creationId xmlns:p14="http://schemas.microsoft.com/office/powerpoint/2010/main" xmlns="" val="1980723131"/>
+        <p14:creationId xmlns="" xmlns:p14="http://schemas.microsoft.com/office/powerpoint/2010/main" val="1980723131"/>
       </p:ext>
     </p:extLst>
   </p:cSld>
@@ -2795,7 +2795,7 @@
     </p:spTree>
     <p:extLst>
       <p:ext uri="{BB962C8B-B14F-4D97-AF65-F5344CB8AC3E}">
-        <p14:creationId xmlns:p14="http://schemas.microsoft.com/office/powerpoint/2010/main" xmlns="" val="1353896245"/>
+        <p14:creationId xmlns="" xmlns:p14="http://schemas.microsoft.com/office/powerpoint/2010/main" val="1353896245"/>
       </p:ext>
     </p:extLst>
   </p:cSld>
@@ -2999,7 +2999,7 @@
     </p:spTree>
     <p:extLst>
       <p:ext uri="{BB962C8B-B14F-4D97-AF65-F5344CB8AC3E}">
-        <p14:creationId xmlns:p14="http://schemas.microsoft.com/office/powerpoint/2010/main" xmlns="" val="3262962747"/>
+        <p14:creationId xmlns="" xmlns:p14="http://schemas.microsoft.com/office/powerpoint/2010/main" val="3262962747"/>
       </p:ext>
     </p:extLst>
   </p:cSld>
@@ -3205,7 +3205,7 @@
             <a:blip r:embed="rId12">
               <a:extLst>
                 <a:ext uri="{28A0092B-C50C-407E-A947-70E740481C1C}">
-                  <a14:useLocalDpi xmlns:a14="http://schemas.microsoft.com/office/drawing/2010/main" xmlns="" val="0"/>
+                  <a14:useLocalDpi xmlns="" xmlns:a14="http://schemas.microsoft.com/office/drawing/2010/main" val="0"/>
                 </a:ext>
               </a:extLst>
             </a:blip>
@@ -3858,7 +3858,12 @@
             <p:ph type="ftr" sz="quarter" idx="11"/>
           </p:nvPr>
         </p:nvSpPr>
-        <p:spPr/>
+        <p:spPr>
+          <a:xfrm>
+            <a:off x="914400" y="6308726"/>
+            <a:ext cx="6866213" cy="468312"/>
+          </a:xfrm>
+        </p:spPr>
         <p:txBody>
           <a:bodyPr/>
           <a:lstStyle/>
@@ -3921,7 +3926,7 @@
     </p:spTree>
     <p:extLst>
       <p:ext uri="{BB962C8B-B14F-4D97-AF65-F5344CB8AC3E}">
-        <p14:creationId xmlns:p14="http://schemas.microsoft.com/office/powerpoint/2010/main" xmlns="" val="925331975"/>
+        <p14:creationId xmlns="" xmlns:p14="http://schemas.microsoft.com/office/powerpoint/2010/main" val="925331975"/>
       </p:ext>
     </p:extLst>
   </p:cSld>
@@ -4074,7 +4079,7 @@
     </p:spTree>
     <p:extLst>
       <p:ext uri="{BB962C8B-B14F-4D97-AF65-F5344CB8AC3E}">
-        <p14:creationId xmlns:p14="http://schemas.microsoft.com/office/powerpoint/2010/main" xmlns="" val="2652730742"/>
+        <p14:creationId xmlns="" xmlns:p14="http://schemas.microsoft.com/office/powerpoint/2010/main" val="2652730742"/>
       </p:ext>
     </p:extLst>
   </p:cSld>
@@ -4197,7 +4202,7 @@
     </p:spTree>
     <p:extLst>
       <p:ext uri="{BB962C8B-B14F-4D97-AF65-F5344CB8AC3E}">
-        <p14:creationId xmlns:p14="http://schemas.microsoft.com/office/powerpoint/2010/main" xmlns="" val="3942276668"/>
+        <p14:creationId xmlns="" xmlns:p14="http://schemas.microsoft.com/office/powerpoint/2010/main" val="3942276668"/>
       </p:ext>
     </p:extLst>
   </p:cSld>
@@ -4339,7 +4344,7 @@
     </p:spTree>
     <p:extLst>
       <p:ext uri="{BB962C8B-B14F-4D97-AF65-F5344CB8AC3E}">
-        <p14:creationId xmlns:p14="http://schemas.microsoft.com/office/powerpoint/2010/main" xmlns="" val="1021420575"/>
+        <p14:creationId xmlns="" xmlns:p14="http://schemas.microsoft.com/office/powerpoint/2010/main" val="1021420575"/>
       </p:ext>
     </p:extLst>
   </p:cSld>
@@ -4462,7 +4467,7 @@
     </p:spTree>
     <p:extLst>
       <p:ext uri="{BB962C8B-B14F-4D97-AF65-F5344CB8AC3E}">
-        <p14:creationId xmlns:p14="http://schemas.microsoft.com/office/powerpoint/2010/main" xmlns="" val="299640975"/>
+        <p14:creationId xmlns="" xmlns:p14="http://schemas.microsoft.com/office/powerpoint/2010/main" val="299640975"/>
       </p:ext>
     </p:extLst>
   </p:cSld>
@@ -4608,7 +4613,7 @@
     </p:spTree>
     <p:extLst>
       <p:ext uri="{BB962C8B-B14F-4D97-AF65-F5344CB8AC3E}">
-        <p14:creationId xmlns:p14="http://schemas.microsoft.com/office/powerpoint/2010/main" xmlns="" val="2652730742"/>
+        <p14:creationId xmlns="" xmlns:p14="http://schemas.microsoft.com/office/powerpoint/2010/main" val="2652730742"/>
       </p:ext>
     </p:extLst>
   </p:cSld>
@@ -4800,8 +4805,39 @@
                 <a:ea typeface="+mn-ea"/>
                 <a:cs typeface="+mn-cs"/>
               </a:rPr>
-              <a:t>Obesity causes 300‘000 deaths annually in the US</a:t>
-            </a:r>
+              <a:t>Obesity causes 300‘000 deaths annually in the </a:t>
+            </a:r>
+            <a:r>
+              <a:rPr kumimoji="0" lang="de-CH" sz="2400" b="0" i="0" u="none" strike="noStrike" kern="1200" cap="none" spc="0" normalizeH="0" baseline="0" noProof="0" dirty="0" smtClean="0">
+                <a:ln>
+                  <a:noFill/>
+                </a:ln>
+                <a:solidFill>
+                  <a:schemeClr val="tx1"/>
+                </a:solidFill>
+                <a:effectLst/>
+                <a:uLnTx/>
+                <a:uFillTx/>
+                <a:latin typeface="+mn-lt"/>
+                <a:ea typeface="+mn-ea"/>
+                <a:cs typeface="+mn-cs"/>
+              </a:rPr>
+              <a:t>US (Flegal, 2004)</a:t>
+            </a:r>
+            <a:endParaRPr kumimoji="0" lang="de-CH" sz="2400" b="0" i="0" u="none" strike="noStrike" kern="1200" cap="none" spc="0" normalizeH="0" baseline="0" noProof="0" dirty="0" smtClean="0">
+              <a:ln>
+                <a:noFill/>
+              </a:ln>
+              <a:solidFill>
+                <a:schemeClr val="tx1"/>
+              </a:solidFill>
+              <a:effectLst/>
+              <a:uLnTx/>
+              <a:uFillTx/>
+              <a:latin typeface="+mn-lt"/>
+              <a:ea typeface="+mn-ea"/>
+              <a:cs typeface="+mn-cs"/>
+            </a:endParaRPr>
           </a:p>
         </p:txBody>
       </p:sp>
@@ -5051,7 +5087,7 @@
     </p:spTree>
     <p:extLst>
       <p:ext uri="{BB962C8B-B14F-4D97-AF65-F5344CB8AC3E}">
-        <p14:creationId xmlns:p14="http://schemas.microsoft.com/office/powerpoint/2010/main" xmlns="" val="2470698625"/>
+        <p14:creationId xmlns="" xmlns:p14="http://schemas.microsoft.com/office/powerpoint/2010/main" val="2470698625"/>
       </p:ext>
     </p:extLst>
   </p:cSld>
@@ -5176,8 +5212,11 @@
           <a:p>
             <a:r>
               <a:rPr lang="de-CH" dirty="0" smtClean="0"/>
-              <a:t>Better understanding obesity to design adequate intervention programs</a:t>
-            </a:r>
+              <a:t>Research question</a:t>
+            </a:r>
+            <a:br>
+              <a:rPr lang="de-CH" dirty="0" smtClean="0"/>
+            </a:br>
             <a:endParaRPr lang="de-CH" dirty="0"/>
           </a:p>
         </p:txBody>
@@ -5208,6 +5247,193 @@
             <a:noAutofit/>
           </a:bodyPr>
           <a:lstStyle/>
+          <a:p>
+            <a:pPr marL="361950" lvl="0" indent="-361950">
+              <a:spcBef>
+                <a:spcPts val="500"/>
+              </a:spcBef>
+              <a:buClr>
+                <a:schemeClr val="bg2"/>
+              </a:buClr>
+              <a:buFont typeface="Wingdings" pitchFamily="2" charset="2"/>
+              <a:buChar char="§"/>
+              <a:defRPr/>
+            </a:pPr>
+            <a:r>
+              <a:rPr kumimoji="0" lang="de-CH" sz="2400" b="0" i="0" u="none" strike="noStrike" kern="1200" cap="none" spc="0" normalizeH="0" noProof="0" dirty="0" smtClean="0">
+                <a:ln>
+                  <a:noFill/>
+                </a:ln>
+                <a:solidFill>
+                  <a:schemeClr val="tx1"/>
+                </a:solidFill>
+                <a:effectLst/>
+                <a:uLnTx/>
+                <a:uFillTx/>
+                <a:latin typeface="+mn-lt"/>
+                <a:ea typeface="+mn-ea"/>
+                <a:cs typeface="+mn-cs"/>
+              </a:rPr>
+              <a:t>SISa </a:t>
+            </a:r>
+            <a:r>
+              <a:rPr kumimoji="0" lang="de-CH" sz="2400" b="0" i="0" u="none" strike="noStrike" kern="1200" cap="none" spc="0" normalizeH="0" noProof="0" dirty="0" smtClean="0">
+                <a:ln>
+                  <a:noFill/>
+                </a:ln>
+                <a:solidFill>
+                  <a:schemeClr val="tx1"/>
+                </a:solidFill>
+                <a:effectLst/>
+                <a:uLnTx/>
+                <a:uFillTx/>
+                <a:latin typeface="+mn-lt"/>
+                <a:ea typeface="+mn-ea"/>
+                <a:cs typeface="+mn-cs"/>
+              </a:rPr>
+              <a:t>model </a:t>
+            </a:r>
+            <a:r>
+              <a:rPr kumimoji="0" lang="de-CH" sz="2400" b="0" i="0" u="none" strike="noStrike" kern="1200" cap="none" spc="0" normalizeH="0" noProof="0" dirty="0" smtClean="0">
+                <a:ln>
+                  <a:noFill/>
+                </a:ln>
+                <a:solidFill>
+                  <a:schemeClr val="tx1"/>
+                </a:solidFill>
+                <a:effectLst/>
+                <a:uLnTx/>
+                <a:uFillTx/>
+                <a:latin typeface="+mn-lt"/>
+                <a:ea typeface="+mn-ea"/>
+                <a:cs typeface="+mn-cs"/>
+              </a:rPr>
+              <a:t>proposed by </a:t>
+            </a:r>
+            <a:r>
+              <a:rPr lang="de-CH" sz="2400" dirty="0" smtClean="0"/>
+              <a:t>Hill et al. (2010) </a:t>
+            </a:r>
+            <a:r>
+              <a:rPr lang="de-CH" sz="2400" dirty="0" smtClean="0"/>
+              <a:t>and </a:t>
+            </a:r>
+            <a:r>
+              <a:rPr kumimoji="0" lang="de-CH" sz="2400" b="0" i="0" u="none" strike="noStrike" kern="1200" cap="none" spc="0" normalizeH="0" noProof="0" dirty="0" smtClean="0">
+                <a:ln>
+                  <a:noFill/>
+                </a:ln>
+                <a:solidFill>
+                  <a:schemeClr val="tx1"/>
+                </a:solidFill>
+                <a:effectLst/>
+                <a:uLnTx/>
+                <a:uFillTx/>
+                <a:latin typeface="+mn-lt"/>
+                <a:ea typeface="+mn-ea"/>
+                <a:cs typeface="+mn-cs"/>
+              </a:rPr>
+              <a:t>derived </a:t>
+            </a:r>
+            <a:r>
+              <a:rPr kumimoji="0" lang="de-CH" sz="2400" b="0" i="0" u="none" strike="noStrike" kern="1200" cap="none" spc="0" normalizeH="0" noProof="0" dirty="0" smtClean="0">
+                <a:ln>
+                  <a:noFill/>
+                </a:ln>
+                <a:solidFill>
+                  <a:schemeClr val="tx1"/>
+                </a:solidFill>
+                <a:effectLst/>
+                <a:uLnTx/>
+                <a:uFillTx/>
+                <a:latin typeface="+mn-lt"/>
+                <a:ea typeface="+mn-ea"/>
+                <a:cs typeface="+mn-cs"/>
+              </a:rPr>
+              <a:t>from </a:t>
+            </a:r>
+            <a:r>
+              <a:rPr kumimoji="0" lang="de-CH" sz="2400" b="0" i="0" u="none" strike="noStrike" kern="1200" cap="none" spc="0" normalizeH="0" noProof="0" dirty="0" smtClean="0">
+                <a:ln>
+                  <a:noFill/>
+                </a:ln>
+                <a:solidFill>
+                  <a:schemeClr val="tx1"/>
+                </a:solidFill>
+                <a:effectLst/>
+                <a:uLnTx/>
+                <a:uFillTx/>
+                <a:latin typeface="+mn-lt"/>
+                <a:ea typeface="+mn-ea"/>
+                <a:cs typeface="+mn-cs"/>
+              </a:rPr>
+              <a:t>SIS to allow for social contagion and  automatic infection</a:t>
+            </a:r>
+          </a:p>
+          <a:p>
+            <a:pPr marL="361950" lvl="0" indent="-361950">
+              <a:spcBef>
+                <a:spcPts val="500"/>
+              </a:spcBef>
+              <a:buClr>
+                <a:schemeClr val="bg2"/>
+              </a:buClr>
+              <a:buFont typeface="Wingdings" pitchFamily="2" charset="2"/>
+              <a:buChar char="§"/>
+              <a:defRPr/>
+            </a:pPr>
+            <a:r>
+              <a:rPr lang="de-CH" sz="2400" dirty="0" smtClean="0"/>
+              <a:t>Model applied to the longitudinal Framingham Heart Study dataset</a:t>
+            </a:r>
+            <a:endParaRPr kumimoji="0" lang="de-CH" sz="2400" b="0" i="0" u="none" strike="noStrike" kern="1200" cap="none" spc="0" normalizeH="0" noProof="0" dirty="0" smtClean="0">
+              <a:ln>
+                <a:noFill/>
+              </a:ln>
+              <a:solidFill>
+                <a:schemeClr val="tx1"/>
+              </a:solidFill>
+              <a:effectLst/>
+              <a:uLnTx/>
+              <a:uFillTx/>
+              <a:latin typeface="+mn-lt"/>
+              <a:ea typeface="+mn-ea"/>
+              <a:cs typeface="+mn-cs"/>
+            </a:endParaRPr>
+          </a:p>
+          <a:p>
+            <a:pPr marL="361950" marR="0" lvl="0" indent="-361950" algn="l" defTabSz="914400" rtl="0" eaLnBrk="1" fontAlgn="auto" latinLnBrk="0" hangingPunct="1">
+              <a:lnSpc>
+                <a:spcPct val="100000"/>
+              </a:lnSpc>
+              <a:spcBef>
+                <a:spcPts val="500"/>
+              </a:spcBef>
+              <a:spcAft>
+                <a:spcPts val="0"/>
+              </a:spcAft>
+              <a:buClr>
+                <a:schemeClr val="bg2"/>
+              </a:buClr>
+              <a:buSzTx/>
+              <a:tabLst/>
+              <a:defRPr/>
+            </a:pPr>
+            <a:endParaRPr kumimoji="0" lang="de-CH" sz="2400" b="0" i="0" u="none" strike="noStrike" kern="1200" cap="none" spc="0" normalizeH="0" noProof="0" dirty="0" smtClean="0">
+              <a:ln>
+                <a:noFill/>
+              </a:ln>
+              <a:solidFill>
+                <a:schemeClr val="tx1"/>
+              </a:solidFill>
+              <a:effectLst/>
+              <a:uLnTx/>
+              <a:uFillTx/>
+              <a:latin typeface="+mn-lt"/>
+              <a:ea typeface="+mn-ea"/>
+              <a:cs typeface="+mn-cs"/>
+            </a:endParaRPr>
+          </a:p>
           <a:p>
             <a:pPr marL="361950" marR="0" lvl="0" indent="-361950" algn="l" defTabSz="914400" rtl="0" eaLnBrk="1" fontAlgn="auto" latinLnBrk="0" hangingPunct="1">
               <a:lnSpc>
@@ -5229,22 +5455,30 @@
               <a:defRPr/>
             </a:pPr>
             <a:r>
-              <a:rPr kumimoji="0" lang="de-CH" sz="2400" b="0" i="0" u="none" strike="noStrike" kern="1200" cap="none" spc="0" normalizeH="0" baseline="0" noProof="0" dirty="0" smtClean="0">
-                <a:ln>
-                  <a:noFill/>
-                </a:ln>
-                <a:solidFill>
-                  <a:schemeClr val="tx1"/>
-                </a:solidFill>
-                <a:effectLst/>
-                <a:uLnTx/>
-                <a:uFillTx/>
-                <a:latin typeface="+mn-lt"/>
-                <a:ea typeface="+mn-ea"/>
-                <a:cs typeface="+mn-cs"/>
-              </a:rPr>
-              <a:t>Hill et al. (2010) developed</a:t>
-            </a:r>
+              <a:rPr lang="de-CH" sz="2400" dirty="0" smtClean="0"/>
+              <a:t>Can we replicate Hill et al. results applying to another dataset?</a:t>
+            </a:r>
+          </a:p>
+          <a:p>
+            <a:pPr marL="361950" marR="0" lvl="0" indent="-361950" algn="l" defTabSz="914400" rtl="0" eaLnBrk="1" fontAlgn="auto" latinLnBrk="0" hangingPunct="1">
+              <a:lnSpc>
+                <a:spcPct val="100000"/>
+              </a:lnSpc>
+              <a:spcBef>
+                <a:spcPts val="500"/>
+              </a:spcBef>
+              <a:spcAft>
+                <a:spcPts val="0"/>
+              </a:spcAft>
+              <a:buClr>
+                <a:schemeClr val="bg2"/>
+              </a:buClr>
+              <a:buSzTx/>
+              <a:buFont typeface="Wingdings" pitchFamily="2" charset="2"/>
+              <a:buChar char="§"/>
+              <a:tabLst/>
+              <a:defRPr/>
+            </a:pPr>
             <a:r>
               <a:rPr kumimoji="0" lang="de-CH" sz="2400" b="0" i="0" u="none" strike="noStrike" kern="1200" cap="none" spc="0" normalizeH="0" noProof="0" dirty="0" smtClean="0">
                 <a:ln>
@@ -5260,25 +5494,43 @@
                 <a:ea typeface="+mn-ea"/>
                 <a:cs typeface="+mn-cs"/>
               </a:rPr>
-              <a:t> an adapatation of the SISa model derived </a:t>
-            </a:r>
-            <a:r>
-              <a:rPr kumimoji="0" lang="de-CH" sz="2400" b="0" i="0" u="none" strike="noStrike" kern="1200" cap="none" spc="0" normalizeH="0" noProof="0" smtClean="0">
-                <a:ln>
-                  <a:noFill/>
-                </a:ln>
-                <a:solidFill>
-                  <a:schemeClr val="tx1"/>
-                </a:solidFill>
-                <a:effectLst/>
-                <a:uLnTx/>
-                <a:uFillTx/>
-                <a:latin typeface="+mn-lt"/>
-                <a:ea typeface="+mn-ea"/>
-                <a:cs typeface="+mn-cs"/>
-              </a:rPr>
-              <a:t>from SIS</a:t>
-            </a:r>
+              <a:t>Does obesity spread through social networks? What about other risk factors?</a:t>
+            </a:r>
+          </a:p>
+          <a:p>
+            <a:pPr marL="361950" marR="0" lvl="0" indent="-361950" algn="l" defTabSz="914400" rtl="0" eaLnBrk="1" fontAlgn="auto" latinLnBrk="0" hangingPunct="1">
+              <a:lnSpc>
+                <a:spcPct val="100000"/>
+              </a:lnSpc>
+              <a:spcBef>
+                <a:spcPts val="500"/>
+              </a:spcBef>
+              <a:spcAft>
+                <a:spcPts val="0"/>
+              </a:spcAft>
+              <a:buClr>
+                <a:schemeClr val="bg2"/>
+              </a:buClr>
+              <a:buSzTx/>
+              <a:buFont typeface="Wingdings" pitchFamily="2" charset="2"/>
+              <a:buChar char="§"/>
+              <a:tabLst/>
+              <a:defRPr/>
+            </a:pPr>
+            <a:endParaRPr kumimoji="0" lang="de-CH" sz="2400" b="0" i="0" u="none" strike="noStrike" kern="1200" cap="none" spc="0" normalizeH="0" noProof="0" dirty="0" smtClean="0">
+              <a:ln>
+                <a:noFill/>
+              </a:ln>
+              <a:solidFill>
+                <a:schemeClr val="tx1"/>
+              </a:solidFill>
+              <a:effectLst/>
+              <a:uLnTx/>
+              <a:uFillTx/>
+              <a:latin typeface="+mn-lt"/>
+              <a:ea typeface="+mn-ea"/>
+              <a:cs typeface="+mn-cs"/>
+            </a:endParaRPr>
           </a:p>
           <a:p>
             <a:pPr marL="361950" marR="0" lvl="0" indent="-361950" algn="l" defTabSz="914400" rtl="0" eaLnBrk="1" fontAlgn="auto" latinLnBrk="0" hangingPunct="1">
@@ -5317,10 +5569,59 @@
           </a:p>
         </p:txBody>
       </p:sp>
+      <p:sp>
+        <p:nvSpPr>
+          <p:cNvPr id="8" name="Isosceles Triangle 7"/>
+          <p:cNvSpPr/>
+          <p:nvPr/>
+        </p:nvSpPr>
+        <p:spPr>
+          <a:xfrm rot="10800000">
+            <a:off x="3848100" y="4114801"/>
+            <a:ext cx="1447800" cy="228600"/>
+          </a:xfrm>
+          <a:prstGeom prst="triangle">
+            <a:avLst/>
+          </a:prstGeom>
+          <a:solidFill>
+            <a:schemeClr val="tx2">
+              <a:lumMod val="20000"/>
+              <a:lumOff val="80000"/>
+            </a:schemeClr>
+          </a:solidFill>
+          <a:ln>
+            <a:noFill/>
+          </a:ln>
+        </p:spPr>
+        <p:style>
+          <a:lnRef idx="2">
+            <a:schemeClr val="accent1">
+              <a:shade val="50000"/>
+            </a:schemeClr>
+          </a:lnRef>
+          <a:fillRef idx="1">
+            <a:schemeClr val="accent1"/>
+          </a:fillRef>
+          <a:effectRef idx="0">
+            <a:schemeClr val="accent1"/>
+          </a:effectRef>
+          <a:fontRef idx="minor">
+            <a:schemeClr val="lt1"/>
+          </a:fontRef>
+        </p:style>
+        <p:txBody>
+          <a:bodyPr rtlCol="0" anchor="ctr"/>
+          <a:lstStyle/>
+          <a:p>
+            <a:pPr algn="ctr"/>
+            <a:endParaRPr lang="en-GB"/>
+          </a:p>
+        </p:txBody>
+      </p:sp>
     </p:spTree>
     <p:extLst>
       <p:ext uri="{BB962C8B-B14F-4D97-AF65-F5344CB8AC3E}">
-        <p14:creationId xmlns:p14="http://schemas.microsoft.com/office/powerpoint/2010/main" xmlns="" val="2470698625"/>
+        <p14:creationId xmlns="" xmlns:p14="http://schemas.microsoft.com/office/powerpoint/2010/main" val="2470698625"/>
       </p:ext>
     </p:extLst>
   </p:cSld>
@@ -5473,7 +5774,7 @@
     </p:spTree>
     <p:extLst>
       <p:ext uri="{BB962C8B-B14F-4D97-AF65-F5344CB8AC3E}">
-        <p14:creationId xmlns:p14="http://schemas.microsoft.com/office/powerpoint/2010/main" xmlns="" val="2652730742"/>
+        <p14:creationId xmlns="" xmlns:p14="http://schemas.microsoft.com/office/powerpoint/2010/main" val="2652730742"/>
       </p:ext>
     </p:extLst>
   </p:cSld>
@@ -5641,7 +5942,7 @@
     </p:spTree>
     <p:extLst>
       <p:ext uri="{BB962C8B-B14F-4D97-AF65-F5344CB8AC3E}">
-        <p14:creationId xmlns:p14="http://schemas.microsoft.com/office/powerpoint/2010/main" xmlns="" val="2413663294"/>
+        <p14:creationId xmlns="" xmlns:p14="http://schemas.microsoft.com/office/powerpoint/2010/main" val="2413663294"/>
       </p:ext>
     </p:extLst>
   </p:cSld>
@@ -5794,7 +6095,7 @@
     </p:spTree>
     <p:extLst>
       <p:ext uri="{BB962C8B-B14F-4D97-AF65-F5344CB8AC3E}">
-        <p14:creationId xmlns:p14="http://schemas.microsoft.com/office/powerpoint/2010/main" xmlns="" val="2652730742"/>
+        <p14:creationId xmlns="" xmlns:p14="http://schemas.microsoft.com/office/powerpoint/2010/main" val="2652730742"/>
       </p:ext>
     </p:extLst>
   </p:cSld>
@@ -5924,7 +6225,7 @@
     </p:spTree>
     <p:extLst>
       <p:ext uri="{BB962C8B-B14F-4D97-AF65-F5344CB8AC3E}">
-        <p14:creationId xmlns:p14="http://schemas.microsoft.com/office/powerpoint/2010/main" xmlns="" val="34058075"/>
+        <p14:creationId xmlns="" xmlns:p14="http://schemas.microsoft.com/office/powerpoint/2010/main" val="34058075"/>
       </p:ext>
     </p:extLst>
   </p:cSld>
@@ -6070,7 +6371,7 @@
     </p:spTree>
     <p:extLst>
       <p:ext uri="{BB962C8B-B14F-4D97-AF65-F5344CB8AC3E}">
-        <p14:creationId xmlns:p14="http://schemas.microsoft.com/office/powerpoint/2010/main" xmlns="" val="2652730742"/>
+        <p14:creationId xmlns="" xmlns:p14="http://schemas.microsoft.com/office/powerpoint/2010/main" val="2652730742"/>
       </p:ext>
     </p:extLst>
   </p:cSld>

</xml_diff>

<commit_message>
Proposition of presentation structure
</commit_message>
<xml_diff>
--- a/presentation/Social Contagion of Obesity Presentation.pptx
+++ b/presentation/Social Contagion of Obesity Presentation.pptx
@@ -377,7 +377,7 @@
     </p:spTree>
     <p:extLst>
       <p:ext uri="{BB962C8B-B14F-4D97-AF65-F5344CB8AC3E}">
-        <p14:creationId xmlns:p14="http://schemas.microsoft.com/office/powerpoint/2010/main" xmlns="" val="277359971"/>
+        <p14:creationId xmlns="" xmlns:p14="http://schemas.microsoft.com/office/powerpoint/2010/main" val="277359971"/>
       </p:ext>
     </p:extLst>
   </p:cSld>
@@ -708,7 +708,7 @@
           <a:blip r:embed="rId2">
             <a:extLst>
               <a:ext uri="{28A0092B-C50C-407E-A947-70E740481C1C}">
-                <a14:useLocalDpi xmlns:a14="http://schemas.microsoft.com/office/drawing/2010/main" xmlns="" val="0"/>
+                <a14:useLocalDpi xmlns="" xmlns:a14="http://schemas.microsoft.com/office/drawing/2010/main" val="0"/>
               </a:ext>
             </a:extLst>
           </a:blip>
@@ -773,7 +773,7 @@
     </p:spTree>
     <p:extLst>
       <p:ext uri="{BB962C8B-B14F-4D97-AF65-F5344CB8AC3E}">
-        <p14:creationId xmlns:p14="http://schemas.microsoft.com/office/powerpoint/2010/main" xmlns="" val="826009964"/>
+        <p14:creationId xmlns="" xmlns:p14="http://schemas.microsoft.com/office/powerpoint/2010/main" val="826009964"/>
       </p:ext>
     </p:extLst>
   </p:cSld>
@@ -934,7 +934,7 @@
     </p:spTree>
     <p:extLst>
       <p:ext uri="{BB962C8B-B14F-4D97-AF65-F5344CB8AC3E}">
-        <p14:creationId xmlns:p14="http://schemas.microsoft.com/office/powerpoint/2010/main" xmlns="" val="748044121"/>
+        <p14:creationId xmlns="" xmlns:p14="http://schemas.microsoft.com/office/powerpoint/2010/main" val="748044121"/>
       </p:ext>
     </p:extLst>
   </p:cSld>
@@ -1250,7 +1250,7 @@
     </p:spTree>
     <p:extLst>
       <p:ext uri="{BB962C8B-B14F-4D97-AF65-F5344CB8AC3E}">
-        <p14:creationId xmlns:p14="http://schemas.microsoft.com/office/powerpoint/2010/main" xmlns="" val="826009964"/>
+        <p14:creationId xmlns="" xmlns:p14="http://schemas.microsoft.com/office/powerpoint/2010/main" val="826009964"/>
       </p:ext>
     </p:extLst>
   </p:cSld>
@@ -1569,7 +1569,7 @@
     </p:spTree>
     <p:extLst>
       <p:ext uri="{BB962C8B-B14F-4D97-AF65-F5344CB8AC3E}">
-        <p14:creationId xmlns:p14="http://schemas.microsoft.com/office/powerpoint/2010/main" xmlns="" val="1490291718"/>
+        <p14:creationId xmlns="" xmlns:p14="http://schemas.microsoft.com/office/powerpoint/2010/main" val="1490291718"/>
       </p:ext>
     </p:extLst>
   </p:cSld>
@@ -1910,7 +1910,7 @@
             <a:blip r:embed="rId3">
               <a:extLst>
                 <a:ext uri="{28A0092B-C50C-407E-A947-70E740481C1C}">
-                  <a14:useLocalDpi xmlns:a14="http://schemas.microsoft.com/office/drawing/2010/main" xmlns="" val="0"/>
+                  <a14:useLocalDpi xmlns="" xmlns:a14="http://schemas.microsoft.com/office/drawing/2010/main" val="0"/>
                 </a:ext>
               </a:extLst>
             </a:blip>
@@ -1973,7 +1973,7 @@
     </p:spTree>
     <p:extLst>
       <p:ext uri="{BB962C8B-B14F-4D97-AF65-F5344CB8AC3E}">
-        <p14:creationId xmlns:p14="http://schemas.microsoft.com/office/powerpoint/2010/main" xmlns="" val="1980723131"/>
+        <p14:creationId xmlns="" xmlns:p14="http://schemas.microsoft.com/office/powerpoint/2010/main" val="1980723131"/>
       </p:ext>
     </p:extLst>
   </p:cSld>
@@ -2798,7 +2798,7 @@
     </p:spTree>
     <p:extLst>
       <p:ext uri="{BB962C8B-B14F-4D97-AF65-F5344CB8AC3E}">
-        <p14:creationId xmlns:p14="http://schemas.microsoft.com/office/powerpoint/2010/main" xmlns="" val="1353896245"/>
+        <p14:creationId xmlns="" xmlns:p14="http://schemas.microsoft.com/office/powerpoint/2010/main" val="1353896245"/>
       </p:ext>
     </p:extLst>
   </p:cSld>
@@ -3002,7 +3002,7 @@
     </p:spTree>
     <p:extLst>
       <p:ext uri="{BB962C8B-B14F-4D97-AF65-F5344CB8AC3E}">
-        <p14:creationId xmlns:p14="http://schemas.microsoft.com/office/powerpoint/2010/main" xmlns="" val="3262962747"/>
+        <p14:creationId xmlns="" xmlns:p14="http://schemas.microsoft.com/office/powerpoint/2010/main" val="3262962747"/>
       </p:ext>
     </p:extLst>
   </p:cSld>
@@ -3208,7 +3208,7 @@
             <a:blip r:embed="rId12">
               <a:extLst>
                 <a:ext uri="{28A0092B-C50C-407E-A947-70E740481C1C}">
-                  <a14:useLocalDpi xmlns:a14="http://schemas.microsoft.com/office/drawing/2010/main" xmlns="" val="0"/>
+                  <a14:useLocalDpi xmlns="" xmlns:a14="http://schemas.microsoft.com/office/drawing/2010/main" val="0"/>
                 </a:ext>
               </a:extLst>
             </a:blip>
@@ -3929,7 +3929,7 @@
     </p:spTree>
     <p:extLst>
       <p:ext uri="{BB962C8B-B14F-4D97-AF65-F5344CB8AC3E}">
-        <p14:creationId xmlns:p14="http://schemas.microsoft.com/office/powerpoint/2010/main" xmlns="" val="925331975"/>
+        <p14:creationId xmlns="" xmlns:p14="http://schemas.microsoft.com/office/powerpoint/2010/main" val="925331975"/>
       </p:ext>
     </p:extLst>
   </p:cSld>
@@ -4101,7 +4101,7 @@
     </p:spTree>
     <p:extLst>
       <p:ext uri="{BB962C8B-B14F-4D97-AF65-F5344CB8AC3E}">
-        <p14:creationId xmlns:p14="http://schemas.microsoft.com/office/powerpoint/2010/main" xmlns="" val="2413663294"/>
+        <p14:creationId xmlns="" xmlns:p14="http://schemas.microsoft.com/office/powerpoint/2010/main" val="2413663294"/>
       </p:ext>
     </p:extLst>
   </p:cSld>
@@ -4140,44 +4140,6 @@
       </p:grpSpPr>
       <p:sp>
         <p:nvSpPr>
-          <p:cNvPr id="2" name="Inhaltsplatzhalter 1"/>
-          <p:cNvSpPr>
-            <a:spLocks noGrp="1"/>
-          </p:cNvSpPr>
-          <p:nvPr>
-            <p:ph sz="half" idx="1"/>
-          </p:nvPr>
-        </p:nvSpPr>
-        <p:spPr/>
-        <p:txBody>
-          <a:bodyPr/>
-          <a:lstStyle/>
-          <a:p>
-            <a:endParaRPr lang="de-CH"/>
-          </a:p>
-        </p:txBody>
-      </p:sp>
-      <p:sp>
-        <p:nvSpPr>
-          <p:cNvPr id="3" name="Inhaltsplatzhalter 2"/>
-          <p:cNvSpPr>
-            <a:spLocks noGrp="1"/>
-          </p:cNvSpPr>
-          <p:nvPr>
-            <p:ph sz="half" idx="2"/>
-          </p:nvPr>
-        </p:nvSpPr>
-        <p:spPr/>
-        <p:txBody>
-          <a:bodyPr/>
-          <a:lstStyle/>
-          <a:p>
-            <a:endParaRPr lang="de-CH"/>
-          </a:p>
-        </p:txBody>
-      </p:sp>
-      <p:sp>
-        <p:nvSpPr>
           <p:cNvPr id="4" name="Datumsplatzhalter 3"/>
           <p:cNvSpPr>
             <a:spLocks noGrp="1"/>
@@ -4274,10 +4236,512 @@
           </a:p>
         </p:txBody>
       </p:sp>
+      <p:sp>
+        <p:nvSpPr>
+          <p:cNvPr id="8" name="Rectangle 7"/>
+          <p:cNvSpPr/>
+          <p:nvPr/>
+        </p:nvSpPr>
+        <p:spPr>
+          <a:xfrm>
+            <a:off x="571500" y="2024063"/>
+            <a:ext cx="2095500" cy="1260000"/>
+          </a:xfrm>
+          <a:prstGeom prst="rect">
+            <a:avLst/>
+          </a:prstGeom>
+          <a:solidFill>
+            <a:schemeClr val="tx2">
+              <a:lumMod val="40000"/>
+              <a:lumOff val="60000"/>
+            </a:schemeClr>
+          </a:solidFill>
+          <a:ln>
+            <a:noFill/>
+          </a:ln>
+        </p:spPr>
+        <p:style>
+          <a:lnRef idx="2">
+            <a:schemeClr val="accent1">
+              <a:shade val="50000"/>
+            </a:schemeClr>
+          </a:lnRef>
+          <a:fillRef idx="1">
+            <a:schemeClr val="accent1"/>
+          </a:fillRef>
+          <a:effectRef idx="0">
+            <a:schemeClr val="accent1"/>
+          </a:effectRef>
+          <a:fontRef idx="minor">
+            <a:schemeClr val="lt1"/>
+          </a:fontRef>
+        </p:style>
+        <p:txBody>
+          <a:bodyPr rtlCol="0" anchor="ctr"/>
+          <a:lstStyle/>
+          <a:p>
+            <a:pPr algn="ctr"/>
+            <a:r>
+              <a:rPr lang="fr-CH" sz="2000" b="1" dirty="0" smtClean="0"/>
+              <a:t>Social contagion</a:t>
+            </a:r>
+            <a:endParaRPr lang="en-GB" sz="2000" b="1" dirty="0"/>
+          </a:p>
+        </p:txBody>
+      </p:sp>
+      <p:sp>
+        <p:nvSpPr>
+          <p:cNvPr id="9" name="Rectangle 8"/>
+          <p:cNvSpPr/>
+          <p:nvPr/>
+        </p:nvSpPr>
+        <p:spPr>
+          <a:xfrm>
+            <a:off x="571500" y="3357563"/>
+            <a:ext cx="2095500" cy="1260000"/>
+          </a:xfrm>
+          <a:prstGeom prst="rect">
+            <a:avLst/>
+          </a:prstGeom>
+          <a:solidFill>
+            <a:schemeClr val="tx2">
+              <a:lumMod val="40000"/>
+              <a:lumOff val="60000"/>
+            </a:schemeClr>
+          </a:solidFill>
+          <a:ln>
+            <a:noFill/>
+          </a:ln>
+        </p:spPr>
+        <p:style>
+          <a:lnRef idx="2">
+            <a:schemeClr val="accent1">
+              <a:shade val="50000"/>
+            </a:schemeClr>
+          </a:lnRef>
+          <a:fillRef idx="1">
+            <a:schemeClr val="accent1"/>
+          </a:fillRef>
+          <a:effectRef idx="0">
+            <a:schemeClr val="accent1"/>
+          </a:effectRef>
+          <a:fontRef idx="minor">
+            <a:schemeClr val="lt1"/>
+          </a:fontRef>
+        </p:style>
+        <p:txBody>
+          <a:bodyPr rtlCol="0" anchor="ctr"/>
+          <a:lstStyle/>
+          <a:p>
+            <a:pPr algn="ctr"/>
+            <a:r>
+              <a:rPr lang="fr-CH" sz="2000" b="1" dirty="0" err="1" smtClean="0"/>
+              <a:t>Homophily</a:t>
+            </a:r>
+            <a:endParaRPr lang="en-GB" sz="2000" b="1" dirty="0"/>
+          </a:p>
+        </p:txBody>
+      </p:sp>
+      <p:sp>
+        <p:nvSpPr>
+          <p:cNvPr id="10" name="Rectangle 9"/>
+          <p:cNvSpPr/>
+          <p:nvPr/>
+        </p:nvSpPr>
+        <p:spPr>
+          <a:xfrm>
+            <a:off x="571500" y="4691063"/>
+            <a:ext cx="2095500" cy="1260000"/>
+          </a:xfrm>
+          <a:prstGeom prst="rect">
+            <a:avLst/>
+          </a:prstGeom>
+          <a:solidFill>
+            <a:schemeClr val="tx2">
+              <a:lumMod val="40000"/>
+              <a:lumOff val="60000"/>
+            </a:schemeClr>
+          </a:solidFill>
+          <a:ln>
+            <a:noFill/>
+          </a:ln>
+        </p:spPr>
+        <p:style>
+          <a:lnRef idx="2">
+            <a:schemeClr val="accent1">
+              <a:shade val="50000"/>
+            </a:schemeClr>
+          </a:lnRef>
+          <a:fillRef idx="1">
+            <a:schemeClr val="accent1"/>
+          </a:fillRef>
+          <a:effectRef idx="0">
+            <a:schemeClr val="accent1"/>
+          </a:effectRef>
+          <a:fontRef idx="minor">
+            <a:schemeClr val="lt1"/>
+          </a:fontRef>
+        </p:style>
+        <p:txBody>
+          <a:bodyPr rtlCol="0" anchor="ctr"/>
+          <a:lstStyle/>
+          <a:p>
+            <a:pPr algn="ctr"/>
+            <a:r>
+              <a:rPr lang="fr-CH" sz="2000" b="1" dirty="0" err="1" smtClean="0"/>
+              <a:t>Confounding</a:t>
+            </a:r>
+            <a:endParaRPr lang="en-GB" sz="2000" b="1" dirty="0"/>
+          </a:p>
+        </p:txBody>
+      </p:sp>
+      <p:sp>
+        <p:nvSpPr>
+          <p:cNvPr id="13" name="Inhaltsplatzhalter 1"/>
+          <p:cNvSpPr txBox="1">
+            <a:spLocks/>
+          </p:cNvSpPr>
+          <p:nvPr/>
+        </p:nvSpPr>
+        <p:spPr>
+          <a:xfrm>
+            <a:off x="2971799" y="2024063"/>
+            <a:ext cx="5848351" cy="1260000"/>
+          </a:xfrm>
+          <a:prstGeom prst="rect">
+            <a:avLst/>
+          </a:prstGeom>
+          <a:noFill/>
+          <a:ln>
+            <a:noFill/>
+          </a:ln>
+        </p:spPr>
+        <p:txBody>
+          <a:bodyPr vert="horz" lIns="140400" tIns="0" rIns="144000" bIns="0" rtlCol="0">
+            <a:noAutofit/>
+          </a:bodyPr>
+          <a:lstStyle/>
+          <a:p>
+            <a:pPr marL="361950" lvl="0" indent="-361950">
+              <a:spcBef>
+                <a:spcPts val="500"/>
+              </a:spcBef>
+              <a:buClr>
+                <a:schemeClr val="bg2"/>
+              </a:buClr>
+              <a:buFont typeface="Wingdings" pitchFamily="2" charset="2"/>
+              <a:buChar char="§"/>
+              <a:defRPr/>
+            </a:pPr>
+            <a:endParaRPr kumimoji="0" lang="de-CH" sz="2400" b="0" i="0" u="none" strike="noStrike" kern="1200" cap="none" spc="0" normalizeH="0" noProof="0" dirty="0" smtClean="0">
+              <a:ln>
+                <a:noFill/>
+              </a:ln>
+              <a:solidFill>
+                <a:schemeClr val="tx1"/>
+              </a:solidFill>
+              <a:effectLst/>
+              <a:uLnTx/>
+              <a:uFillTx/>
+              <a:latin typeface="+mn-lt"/>
+              <a:ea typeface="+mn-ea"/>
+              <a:cs typeface="+mn-cs"/>
+            </a:endParaRPr>
+          </a:p>
+        </p:txBody>
+      </p:sp>
+      <p:sp>
+        <p:nvSpPr>
+          <p:cNvPr id="17" name="Inhaltsplatzhalter 1"/>
+          <p:cNvSpPr txBox="1">
+            <a:spLocks/>
+          </p:cNvSpPr>
+          <p:nvPr/>
+        </p:nvSpPr>
+        <p:spPr>
+          <a:xfrm>
+            <a:off x="2971799" y="3357563"/>
+            <a:ext cx="5848351" cy="1260000"/>
+          </a:xfrm>
+          <a:prstGeom prst="rect">
+            <a:avLst/>
+          </a:prstGeom>
+          <a:noFill/>
+          <a:ln>
+            <a:noFill/>
+          </a:ln>
+        </p:spPr>
+        <p:txBody>
+          <a:bodyPr vert="horz" lIns="140400" tIns="0" rIns="144000" bIns="0" rtlCol="0">
+            <a:noAutofit/>
+          </a:bodyPr>
+          <a:lstStyle/>
+          <a:p>
+            <a:pPr marL="361950" lvl="0" indent="-361950">
+              <a:spcBef>
+                <a:spcPts val="500"/>
+              </a:spcBef>
+              <a:buClr>
+                <a:schemeClr val="bg2"/>
+              </a:buClr>
+              <a:buFont typeface="Wingdings" pitchFamily="2" charset="2"/>
+              <a:buChar char="§"/>
+              <a:defRPr/>
+            </a:pPr>
+            <a:r>
+              <a:rPr kumimoji="0" lang="de-CH" sz="2000" b="0" i="0" u="none" strike="noStrike" kern="1200" cap="none" spc="0" normalizeH="0" noProof="0" dirty="0" smtClean="0">
+                <a:ln>
+                  <a:noFill/>
+                </a:ln>
+                <a:solidFill>
+                  <a:schemeClr val="tx1"/>
+                </a:solidFill>
+                <a:effectLst/>
+                <a:uLnTx/>
+                <a:uFillTx/>
+                <a:latin typeface="+mn-lt"/>
+                <a:ea typeface="+mn-ea"/>
+                <a:cs typeface="+mn-cs"/>
+              </a:rPr>
+              <a:t>Social homophily</a:t>
+            </a:r>
+          </a:p>
+          <a:p>
+            <a:pPr marL="361950" lvl="0" indent="-361950">
+              <a:spcBef>
+                <a:spcPts val="500"/>
+              </a:spcBef>
+              <a:buClr>
+                <a:schemeClr val="bg2"/>
+              </a:buClr>
+              <a:buFont typeface="Wingdings" pitchFamily="2" charset="2"/>
+              <a:buChar char="§"/>
+              <a:defRPr/>
+            </a:pPr>
+            <a:r>
+              <a:rPr lang="de-CH" sz="2000" dirty="0" smtClean="0"/>
+              <a:t>Weight homophily</a:t>
+            </a:r>
+            <a:endParaRPr kumimoji="0" lang="de-CH" sz="2000" b="0" i="0" u="none" strike="noStrike" kern="1200" cap="none" spc="0" normalizeH="0" noProof="0" dirty="0" smtClean="0">
+              <a:ln>
+                <a:noFill/>
+              </a:ln>
+              <a:solidFill>
+                <a:schemeClr val="tx1"/>
+              </a:solidFill>
+              <a:effectLst/>
+              <a:uLnTx/>
+              <a:uFillTx/>
+              <a:latin typeface="+mn-lt"/>
+              <a:ea typeface="+mn-ea"/>
+              <a:cs typeface="+mn-cs"/>
+            </a:endParaRPr>
+          </a:p>
+        </p:txBody>
+      </p:sp>
+      <p:sp>
+        <p:nvSpPr>
+          <p:cNvPr id="18" name="Inhaltsplatzhalter 1"/>
+          <p:cNvSpPr txBox="1">
+            <a:spLocks/>
+          </p:cNvSpPr>
+          <p:nvPr/>
+        </p:nvSpPr>
+        <p:spPr>
+          <a:xfrm>
+            <a:off x="2971799" y="4691063"/>
+            <a:ext cx="5848351" cy="1260000"/>
+          </a:xfrm>
+          <a:prstGeom prst="rect">
+            <a:avLst/>
+          </a:prstGeom>
+          <a:noFill/>
+          <a:ln>
+            <a:noFill/>
+          </a:ln>
+        </p:spPr>
+        <p:txBody>
+          <a:bodyPr vert="horz" lIns="140400" tIns="0" rIns="144000" bIns="0" rtlCol="0">
+            <a:noAutofit/>
+          </a:bodyPr>
+          <a:lstStyle/>
+          <a:p>
+            <a:pPr marL="361950" lvl="0" indent="-361950">
+              <a:spcBef>
+                <a:spcPts val="500"/>
+              </a:spcBef>
+              <a:buClr>
+                <a:schemeClr val="bg2"/>
+              </a:buClr>
+              <a:buFont typeface="Wingdings" pitchFamily="2" charset="2"/>
+              <a:buChar char="§"/>
+              <a:defRPr/>
+            </a:pPr>
+            <a:endParaRPr kumimoji="0" lang="de-CH" sz="2400" b="0" i="0" u="none" strike="noStrike" kern="1200" cap="none" spc="0" normalizeH="0" noProof="0" dirty="0" smtClean="0">
+              <a:ln>
+                <a:noFill/>
+              </a:ln>
+              <a:solidFill>
+                <a:schemeClr val="tx1"/>
+              </a:solidFill>
+              <a:effectLst/>
+              <a:uLnTx/>
+              <a:uFillTx/>
+              <a:latin typeface="+mn-lt"/>
+              <a:ea typeface="+mn-ea"/>
+              <a:cs typeface="+mn-cs"/>
+            </a:endParaRPr>
+          </a:p>
+        </p:txBody>
+      </p:sp>
+      <p:sp>
+        <p:nvSpPr>
+          <p:cNvPr id="19" name="Inhaltsplatzhalter 1"/>
+          <p:cNvSpPr txBox="1">
+            <a:spLocks/>
+          </p:cNvSpPr>
+          <p:nvPr/>
+        </p:nvSpPr>
+        <p:spPr>
+          <a:xfrm>
+            <a:off x="2971799" y="2024063"/>
+            <a:ext cx="5848351" cy="1260000"/>
+          </a:xfrm>
+          <a:prstGeom prst="rect">
+            <a:avLst/>
+          </a:prstGeom>
+          <a:noFill/>
+          <a:ln>
+            <a:noFill/>
+          </a:ln>
+        </p:spPr>
+        <p:txBody>
+          <a:bodyPr vert="horz" lIns="140400" tIns="0" rIns="144000" bIns="0" rtlCol="0">
+            <a:noAutofit/>
+          </a:bodyPr>
+          <a:lstStyle/>
+          <a:p>
+            <a:pPr marL="361950" lvl="0" indent="-361950">
+              <a:spcBef>
+                <a:spcPts val="500"/>
+              </a:spcBef>
+              <a:buClr>
+                <a:schemeClr val="bg2"/>
+              </a:buClr>
+              <a:buFont typeface="Wingdings" pitchFamily="2" charset="2"/>
+              <a:buChar char="§"/>
+              <a:defRPr/>
+            </a:pPr>
+            <a:r>
+              <a:rPr kumimoji="0" lang="de-CH" sz="2000" b="0" i="0" u="none" strike="noStrike" kern="1200" cap="none" spc="0" normalizeH="0" noProof="0" dirty="0" smtClean="0">
+                <a:ln>
+                  <a:noFill/>
+                </a:ln>
+                <a:solidFill>
+                  <a:schemeClr val="tx1"/>
+                </a:solidFill>
+                <a:effectLst/>
+                <a:uLnTx/>
+                <a:uFillTx/>
+                <a:latin typeface="+mn-lt"/>
+                <a:ea typeface="+mn-ea"/>
+                <a:cs typeface="+mn-cs"/>
+              </a:rPr>
+              <a:t>...</a:t>
+            </a:r>
+            <a:endParaRPr kumimoji="0" lang="de-CH" sz="2000" b="0" i="0" u="none" strike="noStrike" kern="1200" cap="none" spc="0" normalizeH="0" noProof="0" dirty="0" smtClean="0">
+              <a:ln>
+                <a:noFill/>
+              </a:ln>
+              <a:solidFill>
+                <a:schemeClr val="tx1"/>
+              </a:solidFill>
+              <a:effectLst/>
+              <a:uLnTx/>
+              <a:uFillTx/>
+              <a:latin typeface="+mn-lt"/>
+              <a:ea typeface="+mn-ea"/>
+              <a:cs typeface="+mn-cs"/>
+            </a:endParaRPr>
+          </a:p>
+        </p:txBody>
+      </p:sp>
+      <p:sp>
+        <p:nvSpPr>
+          <p:cNvPr id="20" name="Inhaltsplatzhalter 1"/>
+          <p:cNvSpPr txBox="1">
+            <a:spLocks/>
+          </p:cNvSpPr>
+          <p:nvPr/>
+        </p:nvSpPr>
+        <p:spPr>
+          <a:xfrm>
+            <a:off x="2971799" y="4691063"/>
+            <a:ext cx="5848351" cy="1260000"/>
+          </a:xfrm>
+          <a:prstGeom prst="rect">
+            <a:avLst/>
+          </a:prstGeom>
+          <a:noFill/>
+          <a:ln>
+            <a:noFill/>
+          </a:ln>
+        </p:spPr>
+        <p:txBody>
+          <a:bodyPr vert="horz" lIns="140400" tIns="0" rIns="144000" bIns="0" rtlCol="0">
+            <a:noAutofit/>
+          </a:bodyPr>
+          <a:lstStyle/>
+          <a:p>
+            <a:pPr marL="361950" lvl="0" indent="-361950">
+              <a:spcBef>
+                <a:spcPts val="500"/>
+              </a:spcBef>
+              <a:buClr>
+                <a:schemeClr val="bg2"/>
+              </a:buClr>
+              <a:buFont typeface="Wingdings" pitchFamily="2" charset="2"/>
+              <a:buChar char="§"/>
+              <a:defRPr/>
+            </a:pPr>
+            <a:r>
+              <a:rPr kumimoji="0" lang="de-CH" sz="2000" b="0" i="0" u="none" strike="noStrike" kern="1200" cap="none" spc="0" normalizeH="0" noProof="0" dirty="0" smtClean="0">
+                <a:ln>
+                  <a:noFill/>
+                </a:ln>
+                <a:solidFill>
+                  <a:schemeClr val="tx1"/>
+                </a:solidFill>
+                <a:effectLst/>
+                <a:uLnTx/>
+                <a:uFillTx/>
+                <a:latin typeface="+mn-lt"/>
+                <a:ea typeface="+mn-ea"/>
+                <a:cs typeface="+mn-cs"/>
+              </a:rPr>
+              <a:t>Household income</a:t>
+            </a:r>
+            <a:endParaRPr kumimoji="0" lang="de-CH" sz="2000" b="0" i="0" u="none" strike="noStrike" kern="1200" cap="none" spc="0" normalizeH="0" noProof="0" dirty="0" smtClean="0">
+              <a:ln>
+                <a:noFill/>
+              </a:ln>
+              <a:solidFill>
+                <a:schemeClr val="tx1"/>
+              </a:solidFill>
+              <a:effectLst/>
+              <a:uLnTx/>
+              <a:uFillTx/>
+              <a:latin typeface="+mn-lt"/>
+              <a:ea typeface="+mn-ea"/>
+              <a:cs typeface="+mn-cs"/>
+            </a:endParaRPr>
+          </a:p>
+        </p:txBody>
+      </p:sp>
     </p:spTree>
     <p:extLst>
       <p:ext uri="{BB962C8B-B14F-4D97-AF65-F5344CB8AC3E}">
-        <p14:creationId xmlns:p14="http://schemas.microsoft.com/office/powerpoint/2010/main" xmlns="" val="2413663294"/>
+        <p14:creationId xmlns="" xmlns:p14="http://schemas.microsoft.com/office/powerpoint/2010/main" val="2413663294"/>
       </p:ext>
     </p:extLst>
   </p:cSld>
@@ -4430,7 +4894,7 @@
     </p:spTree>
     <p:extLst>
       <p:ext uri="{BB962C8B-B14F-4D97-AF65-F5344CB8AC3E}">
-        <p14:creationId xmlns:p14="http://schemas.microsoft.com/office/powerpoint/2010/main" xmlns="" val="2652730742"/>
+        <p14:creationId xmlns="" xmlns:p14="http://schemas.microsoft.com/office/powerpoint/2010/main" val="2652730742"/>
       </p:ext>
     </p:extLst>
   </p:cSld>
@@ -4583,7 +5047,7 @@
     </p:spTree>
     <p:extLst>
       <p:ext uri="{BB962C8B-B14F-4D97-AF65-F5344CB8AC3E}">
-        <p14:creationId xmlns:p14="http://schemas.microsoft.com/office/powerpoint/2010/main" xmlns="" val="2652730742"/>
+        <p14:creationId xmlns="" xmlns:p14="http://schemas.microsoft.com/office/powerpoint/2010/main" val="2652730742"/>
       </p:ext>
     </p:extLst>
   </p:cSld>
@@ -4706,7 +5170,7 @@
     </p:spTree>
     <p:extLst>
       <p:ext uri="{BB962C8B-B14F-4D97-AF65-F5344CB8AC3E}">
-        <p14:creationId xmlns:p14="http://schemas.microsoft.com/office/powerpoint/2010/main" xmlns="" val="3942276668"/>
+        <p14:creationId xmlns="" xmlns:p14="http://schemas.microsoft.com/office/powerpoint/2010/main" val="3942276668"/>
       </p:ext>
     </p:extLst>
   </p:cSld>
@@ -4848,7 +5312,7 @@
     </p:spTree>
     <p:extLst>
       <p:ext uri="{BB962C8B-B14F-4D97-AF65-F5344CB8AC3E}">
-        <p14:creationId xmlns:p14="http://schemas.microsoft.com/office/powerpoint/2010/main" xmlns="" val="1021420575"/>
+        <p14:creationId xmlns="" xmlns:p14="http://schemas.microsoft.com/office/powerpoint/2010/main" val="1021420575"/>
       </p:ext>
     </p:extLst>
   </p:cSld>
@@ -4971,7 +5435,7 @@
     </p:spTree>
     <p:extLst>
       <p:ext uri="{BB962C8B-B14F-4D97-AF65-F5344CB8AC3E}">
-        <p14:creationId xmlns:p14="http://schemas.microsoft.com/office/powerpoint/2010/main" xmlns="" val="299640975"/>
+        <p14:creationId xmlns="" xmlns:p14="http://schemas.microsoft.com/office/powerpoint/2010/main" val="299640975"/>
       </p:ext>
     </p:extLst>
   </p:cSld>
@@ -5117,7 +5581,7 @@
     </p:spTree>
     <p:extLst>
       <p:ext uri="{BB962C8B-B14F-4D97-AF65-F5344CB8AC3E}">
-        <p14:creationId xmlns:p14="http://schemas.microsoft.com/office/powerpoint/2010/main" xmlns="" val="2652730742"/>
+        <p14:creationId xmlns="" xmlns:p14="http://schemas.microsoft.com/office/powerpoint/2010/main" val="2652730742"/>
       </p:ext>
     </p:extLst>
   </p:cSld>
@@ -5560,7 +6024,7 @@
     </p:spTree>
     <p:extLst>
       <p:ext uri="{BB962C8B-B14F-4D97-AF65-F5344CB8AC3E}">
-        <p14:creationId xmlns:p14="http://schemas.microsoft.com/office/powerpoint/2010/main" xmlns="" val="2470698625"/>
+        <p14:creationId xmlns="" xmlns:p14="http://schemas.microsoft.com/office/powerpoint/2010/main" val="2470698625"/>
       </p:ext>
     </p:extLst>
   </p:cSld>
@@ -5895,24 +6359,7 @@
                 <a:ea typeface="+mn-ea"/>
                 <a:cs typeface="+mn-cs"/>
               </a:rPr>
-              <a:t>Does obesity spread through social </a:t>
-            </a:r>
-            <a:r>
-              <a:rPr kumimoji="0" lang="de-CH" sz="2400" b="0" i="0" u="none" strike="noStrike" kern="1200" cap="none" spc="0" normalizeH="0" noProof="0" dirty="0" smtClean="0">
-                <a:ln>
-                  <a:noFill/>
-                </a:ln>
-                <a:solidFill>
-                  <a:schemeClr val="tx1"/>
-                </a:solidFill>
-                <a:effectLst/>
-                <a:uLnTx/>
-                <a:uFillTx/>
-                <a:latin typeface="+mn-lt"/>
-                <a:ea typeface="+mn-ea"/>
-                <a:cs typeface="+mn-cs"/>
-              </a:rPr>
-              <a:t>networks? Is there any automatic infection?</a:t>
+              <a:t>Does obesity spread through social networks? Is there any automatic infection?</a:t>
             </a:r>
           </a:p>
           <a:p>
@@ -5950,24 +6397,7 @@
                 <a:ea typeface="+mn-ea"/>
                 <a:cs typeface="+mn-cs"/>
               </a:rPr>
-              <a:t>What </a:t>
-            </a:r>
-            <a:r>
-              <a:rPr kumimoji="0" lang="de-CH" sz="2400" b="0" i="0" u="none" strike="noStrike" kern="1200" cap="none" spc="0" normalizeH="0" noProof="0" dirty="0" smtClean="0">
-                <a:ln>
-                  <a:noFill/>
-                </a:ln>
-                <a:solidFill>
-                  <a:schemeClr val="tx1"/>
-                </a:solidFill>
-                <a:effectLst/>
-                <a:uLnTx/>
-                <a:uFillTx/>
-                <a:latin typeface="+mn-lt"/>
-                <a:ea typeface="+mn-ea"/>
-                <a:cs typeface="+mn-cs"/>
-              </a:rPr>
-              <a:t>about other risk factors?</a:t>
+              <a:t>What about other risk factors?</a:t>
             </a:r>
           </a:p>
           <a:p>
@@ -6094,7 +6524,7 @@
     </p:spTree>
     <p:extLst>
       <p:ext uri="{BB962C8B-B14F-4D97-AF65-F5344CB8AC3E}">
-        <p14:creationId xmlns:p14="http://schemas.microsoft.com/office/powerpoint/2010/main" xmlns="" val="2470698625"/>
+        <p14:creationId xmlns="" xmlns:p14="http://schemas.microsoft.com/office/powerpoint/2010/main" val="2470698625"/>
       </p:ext>
     </p:extLst>
   </p:cSld>
@@ -6247,7 +6677,7 @@
     </p:spTree>
     <p:extLst>
       <p:ext uri="{BB962C8B-B14F-4D97-AF65-F5344CB8AC3E}">
-        <p14:creationId xmlns:p14="http://schemas.microsoft.com/office/powerpoint/2010/main" xmlns="" val="2652730742"/>
+        <p14:creationId xmlns="" xmlns:p14="http://schemas.microsoft.com/office/powerpoint/2010/main" val="2652730742"/>
       </p:ext>
     </p:extLst>
   </p:cSld>
@@ -6299,7 +6729,23 @@
           <a:bodyPr/>
           <a:lstStyle/>
           <a:p>
-            <a:endParaRPr lang="de-CH"/>
+            <a:r>
+              <a:rPr lang="de-CH" dirty="0" smtClean="0"/>
+              <a:t>Dataset description</a:t>
+            </a:r>
+          </a:p>
+          <a:p>
+            <a:r>
+              <a:rPr lang="de-CH" dirty="0" smtClean="0"/>
+              <a:t>Gephi and matlab result</a:t>
+            </a:r>
+          </a:p>
+          <a:p>
+            <a:r>
+              <a:rPr lang="de-CH" smtClean="0"/>
+              <a:t>Visualization to be included here</a:t>
+            </a:r>
+            <a:endParaRPr lang="de-CH" dirty="0"/>
           </a:p>
         </p:txBody>
       </p:sp>
@@ -6410,7 +6856,11 @@
           <a:p>
             <a:r>
               <a:rPr lang="de-CH" dirty="0" smtClean="0"/>
-              <a:t>Dataset and network description</a:t>
+              <a:t>Dataset </a:t>
+            </a:r>
+            <a:r>
+              <a:rPr lang="de-CH" dirty="0" smtClean="0"/>
+              <a:t> and network description</a:t>
             </a:r>
             <a:endParaRPr lang="de-CH" dirty="0"/>
           </a:p>
@@ -6419,7 +6869,7 @@
     </p:spTree>
     <p:extLst>
       <p:ext uri="{BB962C8B-B14F-4D97-AF65-F5344CB8AC3E}">
-        <p14:creationId xmlns:p14="http://schemas.microsoft.com/office/powerpoint/2010/main" xmlns="" val="2413663294"/>
+        <p14:creationId xmlns="" xmlns:p14="http://schemas.microsoft.com/office/powerpoint/2010/main" val="2413663294"/>
       </p:ext>
     </p:extLst>
   </p:cSld>
@@ -6591,7 +7041,7 @@
     </p:spTree>
     <p:extLst>
       <p:ext uri="{BB962C8B-B14F-4D97-AF65-F5344CB8AC3E}">
-        <p14:creationId xmlns:p14="http://schemas.microsoft.com/office/powerpoint/2010/main" xmlns="" val="2413663294"/>
+        <p14:creationId xmlns="" xmlns:p14="http://schemas.microsoft.com/office/powerpoint/2010/main" val="2413663294"/>
       </p:ext>
     </p:extLst>
   </p:cSld>
@@ -6744,7 +7194,7 @@
     </p:spTree>
     <p:extLst>
       <p:ext uri="{BB962C8B-B14F-4D97-AF65-F5344CB8AC3E}">
-        <p14:creationId xmlns:p14="http://schemas.microsoft.com/office/powerpoint/2010/main" xmlns="" val="2652730742"/>
+        <p14:creationId xmlns="" xmlns:p14="http://schemas.microsoft.com/office/powerpoint/2010/main" val="2652730742"/>
       </p:ext>
     </p:extLst>
   </p:cSld>
@@ -6916,7 +7366,7 @@
     </p:spTree>
     <p:extLst>
       <p:ext uri="{BB962C8B-B14F-4D97-AF65-F5344CB8AC3E}">
-        <p14:creationId xmlns:p14="http://schemas.microsoft.com/office/powerpoint/2010/main" xmlns="" val="2413663294"/>
+        <p14:creationId xmlns="" xmlns:p14="http://schemas.microsoft.com/office/powerpoint/2010/main" val="2413663294"/>
       </p:ext>
     </p:extLst>
   </p:cSld>

</xml_diff>